<commit_message>
Updated brochure and challenges Re-designed brochue_design2 to match slack copy as closely as possible with added section on minecraft and small edits Added more details provide education on top of direction to tasks and finished second task
</commit_message>
<xml_diff>
--- a/leaflet/brochure_design2.pptx
+++ b/leaflet/brochure_design2.pptx
@@ -260,7 +260,7 @@
           <a:p>
             <a:fld id="{B87DEC26-9C8D-4E28-8922-A42F0CC7A2F8}" type="datetimeFigureOut">
               <a:rPr lang="en-GB" smtClean="0"/>
-              <a:t>12/02/2017</a:t>
+              <a:t>13/02/2017</a:t>
             </a:fld>
             <a:endParaRPr lang="en-GB"/>
           </a:p>
@@ -430,7 +430,7 @@
           <a:p>
             <a:fld id="{B87DEC26-9C8D-4E28-8922-A42F0CC7A2F8}" type="datetimeFigureOut">
               <a:rPr lang="en-GB" smtClean="0"/>
-              <a:t>12/02/2017</a:t>
+              <a:t>13/02/2017</a:t>
             </a:fld>
             <a:endParaRPr lang="en-GB"/>
           </a:p>
@@ -610,7 +610,7 @@
           <a:p>
             <a:fld id="{B87DEC26-9C8D-4E28-8922-A42F0CC7A2F8}" type="datetimeFigureOut">
               <a:rPr lang="en-GB" smtClean="0"/>
-              <a:t>12/02/2017</a:t>
+              <a:t>13/02/2017</a:t>
             </a:fld>
             <a:endParaRPr lang="en-GB"/>
           </a:p>
@@ -780,7 +780,7 @@
           <a:p>
             <a:fld id="{B87DEC26-9C8D-4E28-8922-A42F0CC7A2F8}" type="datetimeFigureOut">
               <a:rPr lang="en-GB" smtClean="0"/>
-              <a:t>12/02/2017</a:t>
+              <a:t>13/02/2017</a:t>
             </a:fld>
             <a:endParaRPr lang="en-GB"/>
           </a:p>
@@ -1024,7 +1024,7 @@
           <a:p>
             <a:fld id="{B87DEC26-9C8D-4E28-8922-A42F0CC7A2F8}" type="datetimeFigureOut">
               <a:rPr lang="en-GB" smtClean="0"/>
-              <a:t>12/02/2017</a:t>
+              <a:t>13/02/2017</a:t>
             </a:fld>
             <a:endParaRPr lang="en-GB"/>
           </a:p>
@@ -1256,7 +1256,7 @@
           <a:p>
             <a:fld id="{B87DEC26-9C8D-4E28-8922-A42F0CC7A2F8}" type="datetimeFigureOut">
               <a:rPr lang="en-GB" smtClean="0"/>
-              <a:t>12/02/2017</a:t>
+              <a:t>13/02/2017</a:t>
             </a:fld>
             <a:endParaRPr lang="en-GB"/>
           </a:p>
@@ -1623,7 +1623,7 @@
           <a:p>
             <a:fld id="{B87DEC26-9C8D-4E28-8922-A42F0CC7A2F8}" type="datetimeFigureOut">
               <a:rPr lang="en-GB" smtClean="0"/>
-              <a:t>12/02/2017</a:t>
+              <a:t>13/02/2017</a:t>
             </a:fld>
             <a:endParaRPr lang="en-GB"/>
           </a:p>
@@ -1741,7 +1741,7 @@
           <a:p>
             <a:fld id="{B87DEC26-9C8D-4E28-8922-A42F0CC7A2F8}" type="datetimeFigureOut">
               <a:rPr lang="en-GB" smtClean="0"/>
-              <a:t>12/02/2017</a:t>
+              <a:t>13/02/2017</a:t>
             </a:fld>
             <a:endParaRPr lang="en-GB"/>
           </a:p>
@@ -1836,7 +1836,7 @@
           <a:p>
             <a:fld id="{B87DEC26-9C8D-4E28-8922-A42F0CC7A2F8}" type="datetimeFigureOut">
               <a:rPr lang="en-GB" smtClean="0"/>
-              <a:t>12/02/2017</a:t>
+              <a:t>13/02/2017</a:t>
             </a:fld>
             <a:endParaRPr lang="en-GB"/>
           </a:p>
@@ -2113,7 +2113,7 @@
           <a:p>
             <a:fld id="{B87DEC26-9C8D-4E28-8922-A42F0CC7A2F8}" type="datetimeFigureOut">
               <a:rPr lang="en-GB" smtClean="0"/>
-              <a:t>12/02/2017</a:t>
+              <a:t>13/02/2017</a:t>
             </a:fld>
             <a:endParaRPr lang="en-GB"/>
           </a:p>
@@ -2370,7 +2370,7 @@
           <a:p>
             <a:fld id="{B87DEC26-9C8D-4E28-8922-A42F0CC7A2F8}" type="datetimeFigureOut">
               <a:rPr lang="en-GB" smtClean="0"/>
-              <a:t>12/02/2017</a:t>
+              <a:t>13/02/2017</a:t>
             </a:fld>
             <a:endParaRPr lang="en-GB"/>
           </a:p>
@@ -2583,7 +2583,7 @@
           <a:p>
             <a:fld id="{B87DEC26-9C8D-4E28-8922-A42F0CC7A2F8}" type="datetimeFigureOut">
               <a:rPr lang="en-GB" smtClean="0"/>
-              <a:t>12/02/2017</a:t>
+              <a:t>13/02/2017</a:t>
             </a:fld>
             <a:endParaRPr lang="en-GB"/>
           </a:p>
@@ -3102,7 +3102,7 @@
         <p:spPr>
           <a:xfrm>
             <a:off x="6586381" y="1166060"/>
-            <a:ext cx="2745535" cy="983442"/>
+            <a:ext cx="2745535" cy="1015663"/>
           </a:xfrm>
           <a:prstGeom prst="rect">
             <a:avLst/>
@@ -3120,7 +3120,6 @@
                 <a:solidFill>
                   <a:srgbClr val="002060"/>
                 </a:solidFill>
-                <a:latin typeface="Berlin Sans FB" panose="020E0602020502020306" pitchFamily="34" charset="0"/>
               </a:rPr>
               <a:t>Learning programming with Python and Minecraft</a:t>
             </a:r>
@@ -3128,7 +3127,6 @@
               <a:solidFill>
                 <a:srgbClr val="002060"/>
               </a:solidFill>
-              <a:latin typeface="Berlin Sans FB" panose="020E0602020502020306" pitchFamily="34" charset="0"/>
             </a:endParaRPr>
           </a:p>
         </p:txBody>
@@ -3141,8 +3139,8 @@
         </p:nvSpPr>
         <p:spPr>
           <a:xfrm>
-            <a:off x="3814577" y="755551"/>
-            <a:ext cx="2563672" cy="1162250"/>
+            <a:off x="3814576" y="755551"/>
+            <a:ext cx="2608531" cy="1200329"/>
           </a:xfrm>
           <a:prstGeom prst="rect">
             <a:avLst/>
@@ -3156,14 +3154,26 @@
           <a:lstStyle/>
           <a:p>
             <a:r>
-              <a:rPr lang="en-GB" i="1" dirty="0" smtClean="0">
-                <a:latin typeface="Berlin Sans FB" panose="020E0602020502020306" pitchFamily="34" charset="0"/>
-              </a:rPr>
-              <a:t>Build arbitrary things, turn blocks into bombs or create interactive games, just with one click! </a:t>
-            </a:r>
-            <a:endParaRPr lang="en-GB" i="1" dirty="0">
-              <a:latin typeface="Berlin Sans FB" panose="020E0602020502020306" pitchFamily="34" charset="0"/>
-            </a:endParaRPr>
+              <a:rPr lang="en-GB" i="1" dirty="0" smtClean="0"/>
+              <a:t>Build </a:t>
+            </a:r>
+            <a:r>
+              <a:rPr lang="en-GB" i="1" dirty="0" smtClean="0"/>
+              <a:t>amazing </a:t>
+            </a:r>
+            <a:r>
+              <a:rPr lang="en-GB" i="1" dirty="0" smtClean="0"/>
+              <a:t>things, turn blocks into </a:t>
+            </a:r>
+            <a:r>
+              <a:rPr lang="en-GB" i="1" dirty="0" smtClean="0"/>
+              <a:t>bombs, </a:t>
+            </a:r>
+            <a:r>
+              <a:rPr lang="en-GB" i="1" dirty="0" smtClean="0"/>
+              <a:t>or create interactive games, just with one click! </a:t>
+            </a:r>
+            <a:endParaRPr lang="en-GB" i="1" dirty="0"/>
           </a:p>
         </p:txBody>
       </p:sp>
@@ -3302,7 +3312,7 @@
         <p:spPr>
           <a:xfrm>
             <a:off x="157381" y="108885"/>
-            <a:ext cx="3226454" cy="4738402"/>
+            <a:ext cx="3197982" cy="6001643"/>
           </a:xfrm>
           <a:prstGeom prst="rect">
             <a:avLst/>
@@ -3315,23 +3325,27 @@
           </a:bodyPr>
           <a:lstStyle/>
           <a:p>
-            <a:endParaRPr lang="en-GB" dirty="0"/>
-          </a:p>
-          <a:p>
-            <a:endParaRPr lang="en-GB" dirty="0" smtClean="0"/>
-          </a:p>
-          <a:p>
-            <a:r>
-              <a:rPr lang="en-GB" sz="2000" dirty="0">
+            <a:r>
+              <a:rPr lang="en-GB" sz="2000" dirty="0" smtClean="0">
                 <a:solidFill>
                   <a:srgbClr val="002060"/>
                 </a:solidFill>
-                <a:latin typeface="Berlin Sans FB Demi" panose="020E0802020502020306" pitchFamily="34" charset="0"/>
+                <a:ea typeface="Helvetica" charset="0"/>
+                <a:cs typeface="Helvetica" charset="0"/>
               </a:rPr>
               <a:t>What is Minecraft?</a:t>
             </a:r>
           </a:p>
           <a:p>
+            <a:r>
+              <a:rPr lang="en-GB" dirty="0" smtClean="0"/>
+              <a:t>Minecraft is a best-selling sandbox type video game set in a world where everything is made of blocks.</a:t>
+            </a:r>
+          </a:p>
+          <a:p>
+            <a:endParaRPr lang="en-GB" dirty="0" smtClean="0"/>
+          </a:p>
+          <a:p>
             <a:endParaRPr lang="en-GB" dirty="0"/>
           </a:p>
           <a:p>
@@ -3340,7 +3354,6 @@
                 <a:solidFill>
                   <a:srgbClr val="002060"/>
                 </a:solidFill>
-                <a:latin typeface="Berlin Sans FB Demi" panose="020E0802020502020306" pitchFamily="34" charset="0"/>
               </a:rPr>
               <a:t>What is Python?</a:t>
             </a:r>
@@ -3350,19 +3363,13 @@
               <a:rPr lang="en-GB" dirty="0"/>
               <a:t>Python is a very common and powerful -yet simple- programming language that can be used to modify your Minecraft worlds in real time.</a:t>
             </a:r>
-            <a:endParaRPr lang="en-GB" dirty="0" smtClean="0">
-              <a:latin typeface="Berlin Sans FB" panose="020E0602020502020306" pitchFamily="34" charset="0"/>
-            </a:endParaRPr>
-          </a:p>
-          <a:p>
-            <a:endParaRPr lang="en-GB" dirty="0">
-              <a:latin typeface="Berlin Sans FB" panose="020E0602020502020306" pitchFamily="34" charset="0"/>
-            </a:endParaRPr>
-          </a:p>
-          <a:p>
-            <a:endParaRPr lang="en-GB" dirty="0" smtClean="0">
-              <a:latin typeface="Berlin Sans FB" panose="020E0602020502020306" pitchFamily="34" charset="0"/>
-            </a:endParaRPr>
+            <a:endParaRPr lang="en-GB" dirty="0" smtClean="0"/>
+          </a:p>
+          <a:p>
+            <a:endParaRPr lang="en-GB" dirty="0"/>
+          </a:p>
+          <a:p>
+            <a:endParaRPr lang="en-GB" dirty="0" smtClean="0"/>
           </a:p>
           <a:p>
             <a:r>
@@ -3370,7 +3377,6 @@
                 <a:solidFill>
                   <a:srgbClr val="002060"/>
                 </a:solidFill>
-                <a:latin typeface="Berlin Sans FB Demi" panose="020E0802020502020306" pitchFamily="34" charset="0"/>
               </a:rPr>
               <a:t>PythonTool</a:t>
             </a:r>
@@ -3379,7 +3385,6 @@
                 <a:solidFill>
                   <a:srgbClr val="002060"/>
                 </a:solidFill>
-                <a:latin typeface="Berlin Sans FB Demi" panose="020E0802020502020306" pitchFamily="34" charset="0"/>
               </a:rPr>
               <a:t> Mod:</a:t>
             </a:r>
@@ -3391,7 +3396,15 @@
             </a:r>
             <a:r>
               <a:rPr lang="en-GB" dirty="0" smtClean="0"/>
-              <a:t> Mod provides an interactive way to get started with Python programming inside your Minecraft adventures.</a:t>
+              <a:t> Mod provides an interactive way to get started with Python programming inside your </a:t>
+            </a:r>
+            <a:r>
+              <a:rPr lang="en-GB" dirty="0" smtClean="0"/>
+              <a:t>own Minecraft </a:t>
+            </a:r>
+            <a:r>
+              <a:rPr lang="en-GB" dirty="0" smtClean="0"/>
+              <a:t>adventures.</a:t>
             </a:r>
           </a:p>
         </p:txBody>
@@ -3483,7 +3496,7 @@
         <p:spPr>
           <a:xfrm>
             <a:off x="6600858" y="687579"/>
-            <a:ext cx="2675998" cy="506621"/>
+            <a:ext cx="2675998" cy="523220"/>
           </a:xfrm>
           <a:prstGeom prst="rect">
             <a:avLst/>
@@ -3501,24 +3514,29 @@
                 <a:solidFill>
                   <a:srgbClr val="002060"/>
                 </a:solidFill>
-                <a:latin typeface="Berlin Sans FB Demi" panose="020E0802020502020306" pitchFamily="34" charset="0"/>
               </a:rPr>
-              <a:t>PytonTool</a:t>
+              <a:t>PythonTool</a:t>
             </a:r>
             <a:r>
               <a:rPr lang="en-GB" sz="2800" dirty="0" smtClean="0">
                 <a:solidFill>
                   <a:srgbClr val="002060"/>
                 </a:solidFill>
-                <a:latin typeface="Berlin Sans FB Demi" panose="020E0802020502020306" pitchFamily="34" charset="0"/>
               </a:rPr>
-              <a:t> Mod</a:t>
+              <a:t> </a:t>
+            </a:r>
+            <a:r>
+              <a:rPr lang="en-GB" sz="2800" dirty="0" smtClean="0">
+                <a:solidFill>
+                  <a:srgbClr val="002060"/>
+                </a:solidFill>
+              </a:rPr>
+              <a:t>Mod</a:t>
             </a:r>
             <a:endParaRPr lang="en-GB" sz="2800" dirty="0">
               <a:solidFill>
                 <a:srgbClr val="002060"/>
               </a:solidFill>
-              <a:latin typeface="Berlin Sans FB Demi" panose="020E0802020502020306" pitchFamily="34" charset="0"/>
             </a:endParaRPr>
           </a:p>
         </p:txBody>
@@ -3563,16 +3581,16 @@
       </p:grpSpPr>
       <p:sp>
         <p:nvSpPr>
-          <p:cNvPr id="5" name="Rectangle 4"/>
+          <p:cNvPr id="4" name="Rounded Rectangle 3"/>
           <p:cNvSpPr/>
           <p:nvPr/>
         </p:nvSpPr>
         <p:spPr>
           <a:xfrm>
-            <a:off x="6575237" y="140836"/>
-            <a:ext cx="3128321" cy="2182039"/>
+            <a:off x="6614482" y="140836"/>
+            <a:ext cx="3022986" cy="1633421"/>
           </a:xfrm>
-          <a:prstGeom prst="rect">
+          <a:prstGeom prst="roundRect">
             <a:avLst/>
           </a:prstGeom>
           <a:solidFill>
@@ -3603,7 +3621,7 @@
           <a:lstStyle/>
           <a:p>
             <a:pPr algn="ctr"/>
-            <a:endParaRPr lang="en-GB"/>
+            <a:endParaRPr lang="en-US"/>
           </a:p>
         </p:txBody>
       </p:sp>
@@ -3644,8 +3662,8 @@
         </p:nvSpPr>
         <p:spPr>
           <a:xfrm>
-            <a:off x="6797490" y="302577"/>
-            <a:ext cx="2806228" cy="1858556"/>
+            <a:off x="6736283" y="143041"/>
+            <a:ext cx="2806228" cy="1631216"/>
           </a:xfrm>
           <a:prstGeom prst="rect">
             <a:avLst/>
@@ -3657,62 +3675,61 @@
           </a:bodyPr>
           <a:lstStyle/>
           <a:p>
-            <a:pPr>
-              <a:lnSpc>
-                <a:spcPct val="120000"/>
-              </a:lnSpc>
-            </a:pPr>
-            <a:r>
-              <a:rPr lang="en-GB" sz="2000" b="1" i="1" dirty="0" err="1" smtClean="0">
+            <a:r>
+              <a:rPr lang="en-GB" sz="2000" b="1" dirty="0" err="1" smtClean="0">
                 <a:solidFill>
                   <a:srgbClr val="002060"/>
                 </a:solidFill>
                 <a:effectLst/>
-                <a:latin typeface="Open Sans"/>
               </a:rPr>
               <a:t>PythonTool</a:t>
             </a:r>
             <a:r>
-              <a:rPr lang="en-GB" sz="2000" b="1" i="1" dirty="0" smtClean="0">
+              <a:rPr lang="en-GB" sz="2000" b="1" dirty="0" smtClean="0">
                 <a:solidFill>
                   <a:srgbClr val="002060"/>
                 </a:solidFill>
                 <a:effectLst/>
-                <a:latin typeface="Open Sans"/>
               </a:rPr>
               <a:t> Mod </a:t>
             </a:r>
             <a:r>
-              <a:rPr lang="en-GB" sz="2000" b="0" i="1" dirty="0" smtClean="0">
+              <a:rPr lang="en-GB" sz="2000" b="0" dirty="0" smtClean="0">
                 <a:solidFill>
                   <a:srgbClr val="002060"/>
                 </a:solidFill>
                 <a:effectLst/>
-                <a:latin typeface="Open Sans"/>
               </a:rPr>
               <a:t>for </a:t>
             </a:r>
             <a:r>
-              <a:rPr lang="en-GB" sz="2000" b="1" i="1" dirty="0" smtClean="0">
+              <a:rPr lang="en-GB" sz="2000" b="1" dirty="0" smtClean="0">
                 <a:solidFill>
                   <a:srgbClr val="002060"/>
                 </a:solidFill>
                 <a:effectLst/>
-                <a:latin typeface="Open Sans"/>
               </a:rPr>
               <a:t>Minecraft</a:t>
             </a:r>
             <a:r>
-              <a:rPr lang="en-GB" sz="2000" b="0" i="1" dirty="0" smtClean="0">
+              <a:rPr lang="en-GB" sz="2000" b="0" dirty="0" smtClean="0">
                 <a:solidFill>
                   <a:srgbClr val="002060"/>
                 </a:solidFill>
                 <a:effectLst/>
-                <a:latin typeface="Open Sans"/>
               </a:rPr>
-              <a:t> interactively alters your Minecraft world in real time, using Python</a:t>
-            </a:r>
-            <a:endParaRPr lang="en-GB" sz="2000" i="1" dirty="0">
+              <a:t> interactively alters your Minecraft world in real time, using </a:t>
+            </a:r>
+            <a:r>
+              <a:rPr lang="en-GB" sz="2000" b="0" dirty="0" smtClean="0">
+                <a:solidFill>
+                  <a:srgbClr val="002060"/>
+                </a:solidFill>
+                <a:effectLst/>
+              </a:rPr>
+              <a:t>Python!</a:t>
+            </a:r>
+            <a:endParaRPr lang="en-GB" sz="2000" dirty="0">
               <a:solidFill>
                 <a:srgbClr val="002060"/>
               </a:solidFill>
@@ -3728,8 +3745,8 @@
         </p:nvSpPr>
         <p:spPr>
           <a:xfrm>
-            <a:off x="6609352" y="3452645"/>
-            <a:ext cx="3039614" cy="954107"/>
+            <a:off x="6732867" y="2819860"/>
+            <a:ext cx="2877465" cy="1569660"/>
           </a:xfrm>
           <a:prstGeom prst="rect">
             <a:avLst/>
@@ -3742,91 +3759,150 @@
           <a:lstStyle/>
           <a:p>
             <a:r>
-              <a:rPr lang="en-GB" sz="1400" dirty="0" smtClean="0">
+              <a:rPr lang="en-GB" sz="1600" b="1" dirty="0" smtClean="0">
                 <a:solidFill>
                   <a:schemeClr val="accent1">
                     <a:lumMod val="40000"/>
                     <a:lumOff val="60000"/>
                   </a:schemeClr>
                 </a:solidFill>
-                <a:latin typeface="Berlin Sans FB" panose="020E0602020502020306" pitchFamily="34" charset="0"/>
+                <a:ea typeface="Helvetica" charset="0"/>
+                <a:cs typeface="Helvetica" charset="0"/>
               </a:rPr>
               <a:t>MIT License </a:t>
             </a:r>
           </a:p>
           <a:p>
             <a:r>
-              <a:rPr lang="en-GB" sz="1400" dirty="0" smtClean="0">
+              <a:rPr lang="en-GB" sz="1600" b="1" dirty="0" smtClean="0">
                 <a:solidFill>
                   <a:schemeClr val="accent1">
                     <a:lumMod val="40000"/>
                     <a:lumOff val="60000"/>
                   </a:schemeClr>
                 </a:solidFill>
-                <a:latin typeface="Berlin Sans FB" panose="020E0602020502020306" pitchFamily="34" charset="0"/>
+                <a:ea typeface="Helvetica" charset="0"/>
+                <a:cs typeface="Helvetica" charset="0"/>
               </a:rPr>
-              <a:t>Copyright (c) 2016, Alvaro Perez-Diaz </a:t>
-            </a:r>
-          </a:p>
-          <a:p>
-            <a:r>
-              <a:rPr lang="en-GB" sz="1400" dirty="0" smtClean="0">
+              <a:t>Copyright (c) </a:t>
+            </a:r>
+            <a:r>
+              <a:rPr lang="en-GB" sz="1600" b="1" dirty="0" smtClean="0">
                 <a:solidFill>
                   <a:schemeClr val="accent1">
                     <a:lumMod val="40000"/>
                     <a:lumOff val="60000"/>
                   </a:schemeClr>
                 </a:solidFill>
-                <a:latin typeface="Berlin Sans FB" panose="020E0602020502020306" pitchFamily="34" charset="0"/>
+                <a:ea typeface="Helvetica" charset="0"/>
+                <a:cs typeface="Helvetica" charset="0"/>
               </a:rPr>
-              <a:t>&amp; Hans </a:t>
-            </a:r>
-            <a:r>
-              <a:rPr lang="en-GB" sz="1400" dirty="0" err="1" smtClean="0">
+              <a:t>2016,</a:t>
+            </a:r>
+          </a:p>
+          <a:p>
+            <a:r>
+              <a:rPr lang="en-GB" sz="1600" b="1" dirty="0" smtClean="0">
                 <a:solidFill>
                   <a:schemeClr val="accent1">
                     <a:lumMod val="40000"/>
                     <a:lumOff val="60000"/>
                   </a:schemeClr>
                 </a:solidFill>
-                <a:latin typeface="Berlin Sans FB" panose="020E0602020502020306" pitchFamily="34" charset="0"/>
+                <a:ea typeface="Helvetica" charset="0"/>
+                <a:cs typeface="Helvetica" charset="0"/>
               </a:rPr>
-              <a:t>Fangohr</a:t>
-            </a:r>
-            <a:r>
-              <a:rPr lang="en-GB" sz="1400" dirty="0" smtClean="0">
+              <a:t>Alvaro </a:t>
+            </a:r>
+            <a:r>
+              <a:rPr lang="en-GB" sz="1600" b="1" dirty="0" smtClean="0">
                 <a:solidFill>
                   <a:schemeClr val="accent1">
                     <a:lumMod val="40000"/>
                     <a:lumOff val="60000"/>
                   </a:schemeClr>
                 </a:solidFill>
-                <a:latin typeface="Berlin Sans FB" panose="020E0602020502020306" pitchFamily="34" charset="0"/>
+                <a:ea typeface="Helvetica" charset="0"/>
+                <a:cs typeface="Helvetica" charset="0"/>
               </a:rPr>
-              <a:t>.</a:t>
-            </a:r>
-          </a:p>
-          <a:p>
-            <a:r>
-              <a:rPr lang="en-GB" sz="1400" dirty="0" smtClean="0">
+              <a:t>Perez-Diaz </a:t>
+            </a:r>
+            <a:r>
+              <a:rPr lang="en-GB" sz="1600" b="1" dirty="0" smtClean="0">
                 <a:solidFill>
                   <a:schemeClr val="accent1">
                     <a:lumMod val="40000"/>
                     <a:lumOff val="60000"/>
                   </a:schemeClr>
                 </a:solidFill>
-                <a:latin typeface="Berlin Sans FB" panose="020E0602020502020306" pitchFamily="34" charset="0"/>
+                <a:ea typeface="Helvetica" charset="0"/>
+                <a:cs typeface="Helvetica" charset="0"/>
+              </a:rPr>
+              <a:t>&amp; </a:t>
+            </a:r>
+            <a:r>
+              <a:rPr lang="en-GB" sz="1600" b="1" dirty="0" smtClean="0">
+                <a:solidFill>
+                  <a:schemeClr val="accent1">
+                    <a:lumMod val="40000"/>
+                    <a:lumOff val="60000"/>
+                  </a:schemeClr>
+                </a:solidFill>
+                <a:ea typeface="Helvetica" charset="0"/>
+                <a:cs typeface="Helvetica" charset="0"/>
+              </a:rPr>
+              <a:t>Hans </a:t>
+            </a:r>
+            <a:r>
+              <a:rPr lang="en-GB" sz="1600" b="1" dirty="0" err="1" smtClean="0">
+                <a:solidFill>
+                  <a:schemeClr val="accent1">
+                    <a:lumMod val="40000"/>
+                    <a:lumOff val="60000"/>
+                  </a:schemeClr>
+                </a:solidFill>
+                <a:ea typeface="Helvetica" charset="0"/>
+                <a:cs typeface="Helvetica" charset="0"/>
+              </a:rPr>
+              <a:t>Fangohr</a:t>
+            </a:r>
+            <a:r>
+              <a:rPr lang="en-GB" sz="1600" b="1" dirty="0" smtClean="0">
+                <a:solidFill>
+                  <a:schemeClr val="accent1">
+                    <a:lumMod val="40000"/>
+                    <a:lumOff val="60000"/>
+                  </a:schemeClr>
+                </a:solidFill>
+                <a:ea typeface="Helvetica" charset="0"/>
+                <a:cs typeface="Helvetica" charset="0"/>
+              </a:rPr>
+              <a:t>.</a:t>
+            </a:r>
+          </a:p>
+          <a:p>
+            <a:r>
+              <a:rPr lang="en-GB" sz="1600" b="1" dirty="0" smtClean="0">
+                <a:solidFill>
+                  <a:schemeClr val="accent1">
+                    <a:lumMod val="40000"/>
+                    <a:lumOff val="60000"/>
+                  </a:schemeClr>
+                </a:solidFill>
+                <a:ea typeface="Helvetica" charset="0"/>
+                <a:cs typeface="Helvetica" charset="0"/>
               </a:rPr>
               <a:t>NGCM, University of Southampton, UK</a:t>
             </a:r>
-            <a:endParaRPr lang="en-GB" sz="1400" dirty="0">
+            <a:endParaRPr lang="en-GB" sz="1600" b="1" dirty="0">
               <a:solidFill>
                 <a:schemeClr val="accent1">
                   <a:lumMod val="40000"/>
                   <a:lumOff val="60000"/>
                 </a:schemeClr>
               </a:solidFill>
-              <a:latin typeface="Berlin Sans FB" panose="020E0602020502020306" pitchFamily="34" charset="0"/>
+              <a:ea typeface="Helvetica" charset="0"/>
+              <a:cs typeface="Helvetica" charset="0"/>
             </a:endParaRPr>
           </a:p>
         </p:txBody>
@@ -3839,8 +3915,8 @@
         </p:nvSpPr>
         <p:spPr>
           <a:xfrm>
-            <a:off x="6732081" y="2532285"/>
-            <a:ext cx="2675532" cy="885027"/>
+            <a:off x="6732867" y="1901064"/>
+            <a:ext cx="2675532" cy="861774"/>
           </a:xfrm>
           <a:prstGeom prst="rect">
             <a:avLst/>
@@ -3854,26 +3930,19 @@
           <a:lstStyle/>
           <a:p>
             <a:r>
-              <a:rPr lang="en-GB" dirty="0" smtClean="0">
+              <a:rPr lang="en-GB" b="1" dirty="0" smtClean="0">
                 <a:solidFill>
                   <a:schemeClr val="bg1"/>
                 </a:solidFill>
-                <a:latin typeface="Berlin Sans FB" panose="020E0602020502020306" pitchFamily="34" charset="0"/>
+                <a:ea typeface="Helvetica" charset="0"/>
+                <a:cs typeface="Helvetica" charset="0"/>
               </a:rPr>
-              <a:t>Get in touch</a:t>
-            </a:r>
-            <a:r>
-              <a:rPr lang="en-GB" dirty="0" smtClean="0">
-                <a:solidFill>
-                  <a:schemeClr val="bg1"/>
-                </a:solidFill>
-              </a:rPr>
-              <a:t>:</a:t>
-            </a:r>
-          </a:p>
-          <a:p>
-            <a:r>
-              <a:rPr lang="en-GB" i="1" dirty="0" err="1" smtClean="0">
+              <a:t>Get in touch:</a:t>
+            </a:r>
+          </a:p>
+          <a:p>
+            <a:r>
+              <a:rPr lang="en-GB" sz="1600" i="1" dirty="0" err="1" smtClean="0">
                 <a:solidFill>
                   <a:schemeClr val="bg1"/>
                 </a:solidFill>
@@ -3881,7 +3950,7 @@
               <a:t>PythonTool</a:t>
             </a:r>
             <a:r>
-              <a:rPr lang="en-GB" i="1" dirty="0" smtClean="0">
+              <a:rPr lang="en-GB" sz="1600" i="1" dirty="0" smtClean="0">
                 <a:solidFill>
                   <a:schemeClr val="bg1"/>
                 </a:solidFill>
@@ -3891,14 +3960,14 @@
           </a:p>
           <a:p>
             <a:r>
-              <a:rPr lang="en-GB" dirty="0" smtClean="0">
+              <a:rPr lang="en-GB" sz="1600" dirty="0" smtClean="0">
                 <a:solidFill>
                   <a:schemeClr val="bg1"/>
                 </a:solidFill>
               </a:rPr>
               <a:t>a.perez-diaz@soton.ac.uk</a:t>
             </a:r>
-            <a:endParaRPr lang="en-GB" dirty="0">
+            <a:endParaRPr lang="en-GB" sz="1600" dirty="0">
               <a:solidFill>
                 <a:schemeClr val="bg1"/>
               </a:solidFill>
@@ -3914,8 +3983,8 @@
         </p:nvSpPr>
         <p:spPr>
           <a:xfrm>
-            <a:off x="474259" y="497737"/>
-            <a:ext cx="4816446" cy="3628610"/>
+            <a:off x="286134" y="140836"/>
+            <a:ext cx="4816446" cy="4339650"/>
           </a:xfrm>
           <a:prstGeom prst="rect">
             <a:avLst/>
@@ -3929,20 +3998,18 @@
           <a:lstStyle/>
           <a:p>
             <a:r>
-              <a:rPr lang="en-GB" sz="2000" dirty="0">
+              <a:rPr lang="en-GB" sz="2400" b="1" dirty="0">
                 <a:solidFill>
                   <a:schemeClr val="bg1"/>
                 </a:solidFill>
-                <a:latin typeface="Berlin Sans FB Demi" panose="020E0802020502020306" pitchFamily="34" charset="0"/>
               </a:rPr>
               <a:t>Ever wanted to learn how to program</a:t>
             </a:r>
             <a:r>
-              <a:rPr lang="en-GB" sz="2000" dirty="0" smtClean="0">
+              <a:rPr lang="en-GB" sz="2400" b="1" dirty="0" smtClean="0">
                 <a:solidFill>
                   <a:schemeClr val="bg1"/>
                 </a:solidFill>
-                <a:latin typeface="Berlin Sans FB Demi" panose="020E0802020502020306" pitchFamily="34" charset="0"/>
               </a:rPr>
               <a:t>?</a:t>
             </a:r>
@@ -3960,7 +4027,6 @@
               <a:solidFill>
                 <a:schemeClr val="bg1"/>
               </a:solidFill>
-              <a:latin typeface="Berlin Sans FB Demi" panose="020E0802020502020306" pitchFamily="34" charset="0"/>
             </a:endParaRPr>
           </a:p>
           <a:p>
@@ -3968,7 +4034,6 @@
               <a:solidFill>
                 <a:schemeClr val="bg1"/>
               </a:solidFill>
-              <a:latin typeface="Berlin Sans FB Demi" panose="020E0802020502020306" pitchFamily="34" charset="0"/>
             </a:endParaRPr>
           </a:p>
           <a:p>
@@ -3976,7 +4041,6 @@
               <a:solidFill>
                 <a:schemeClr val="bg1"/>
               </a:solidFill>
-              <a:latin typeface="Berlin Sans FB Demi" panose="020E0802020502020306" pitchFamily="34" charset="0"/>
             </a:endParaRPr>
           </a:p>
           <a:p>
@@ -3984,7 +4048,6 @@
               <a:solidFill>
                 <a:schemeClr val="bg1"/>
               </a:solidFill>
-              <a:latin typeface="Berlin Sans FB Demi" panose="020E0802020502020306" pitchFamily="34" charset="0"/>
             </a:endParaRPr>
           </a:p>
           <a:p>
@@ -3992,24 +4055,14 @@
               <a:solidFill>
                 <a:schemeClr val="bg1"/>
               </a:solidFill>
-              <a:latin typeface="Berlin Sans FB Demi" panose="020E0802020502020306" pitchFamily="34" charset="0"/>
             </a:endParaRPr>
           </a:p>
           <a:p>
-            <a:endParaRPr lang="en-GB" sz="2000" dirty="0" smtClean="0">
-              <a:solidFill>
-                <a:schemeClr val="bg1"/>
-              </a:solidFill>
-              <a:latin typeface="Berlin Sans FB Demi" panose="020E0802020502020306" pitchFamily="34" charset="0"/>
-            </a:endParaRPr>
-          </a:p>
-          <a:p>
-            <a:r>
-              <a:rPr lang="en-GB" sz="2000" dirty="0" smtClean="0">
+            <a:r>
+              <a:rPr lang="en-GB" sz="2400" b="1" dirty="0" smtClean="0">
                 <a:solidFill>
                   <a:schemeClr val="bg1"/>
                 </a:solidFill>
-                <a:latin typeface="Berlin Sans FB Demi" panose="020E0802020502020306" pitchFamily="34" charset="0"/>
               </a:rPr>
               <a:t>Get more examples and start coding at:</a:t>
             </a:r>
@@ -4035,7 +4088,6 @@
               <a:solidFill>
                 <a:schemeClr val="bg1"/>
               </a:solidFill>
-              <a:latin typeface="Berlin Sans FB Demi" panose="020E0802020502020306" pitchFamily="34" charset="0"/>
             </a:endParaRPr>
           </a:p>
         </p:txBody>
@@ -4077,8 +4129,8 @@
         </p:nvSpPr>
         <p:spPr>
           <a:xfrm>
-            <a:off x="6614482" y="2446144"/>
-            <a:ext cx="3022986" cy="2027381"/>
+            <a:off x="6614482" y="1901064"/>
+            <a:ext cx="3022986" cy="2483921"/>
           </a:xfrm>
           <a:prstGeom prst="roundRect">
             <a:avLst/>

</xml_diff>

<commit_message>
Added non-framed version of updates seen on slack
</commit_message>
<xml_diff>
--- a/leaflet/brochure_design2.pptx
+++ b/leaflet/brochure_design2.pptx
@@ -260,7 +260,7 @@
           <a:p>
             <a:fld id="{B87DEC26-9C8D-4E28-8922-A42F0CC7A2F8}" type="datetimeFigureOut">
               <a:rPr lang="en-GB" smtClean="0"/>
-              <a:t>13/02/2017</a:t>
+              <a:t>14/02/2017</a:t>
             </a:fld>
             <a:endParaRPr lang="en-GB"/>
           </a:p>
@@ -430,7 +430,7 @@
           <a:p>
             <a:fld id="{B87DEC26-9C8D-4E28-8922-A42F0CC7A2F8}" type="datetimeFigureOut">
               <a:rPr lang="en-GB" smtClean="0"/>
-              <a:t>13/02/2017</a:t>
+              <a:t>14/02/2017</a:t>
             </a:fld>
             <a:endParaRPr lang="en-GB"/>
           </a:p>
@@ -610,7 +610,7 @@
           <a:p>
             <a:fld id="{B87DEC26-9C8D-4E28-8922-A42F0CC7A2F8}" type="datetimeFigureOut">
               <a:rPr lang="en-GB" smtClean="0"/>
-              <a:t>13/02/2017</a:t>
+              <a:t>14/02/2017</a:t>
             </a:fld>
             <a:endParaRPr lang="en-GB"/>
           </a:p>
@@ -780,7 +780,7 @@
           <a:p>
             <a:fld id="{B87DEC26-9C8D-4E28-8922-A42F0CC7A2F8}" type="datetimeFigureOut">
               <a:rPr lang="en-GB" smtClean="0"/>
-              <a:t>13/02/2017</a:t>
+              <a:t>14/02/2017</a:t>
             </a:fld>
             <a:endParaRPr lang="en-GB"/>
           </a:p>
@@ -1024,7 +1024,7 @@
           <a:p>
             <a:fld id="{B87DEC26-9C8D-4E28-8922-A42F0CC7A2F8}" type="datetimeFigureOut">
               <a:rPr lang="en-GB" smtClean="0"/>
-              <a:t>13/02/2017</a:t>
+              <a:t>14/02/2017</a:t>
             </a:fld>
             <a:endParaRPr lang="en-GB"/>
           </a:p>
@@ -1256,7 +1256,7 @@
           <a:p>
             <a:fld id="{B87DEC26-9C8D-4E28-8922-A42F0CC7A2F8}" type="datetimeFigureOut">
               <a:rPr lang="en-GB" smtClean="0"/>
-              <a:t>13/02/2017</a:t>
+              <a:t>14/02/2017</a:t>
             </a:fld>
             <a:endParaRPr lang="en-GB"/>
           </a:p>
@@ -1623,7 +1623,7 @@
           <a:p>
             <a:fld id="{B87DEC26-9C8D-4E28-8922-A42F0CC7A2F8}" type="datetimeFigureOut">
               <a:rPr lang="en-GB" smtClean="0"/>
-              <a:t>13/02/2017</a:t>
+              <a:t>14/02/2017</a:t>
             </a:fld>
             <a:endParaRPr lang="en-GB"/>
           </a:p>
@@ -1741,7 +1741,7 @@
           <a:p>
             <a:fld id="{B87DEC26-9C8D-4E28-8922-A42F0CC7A2F8}" type="datetimeFigureOut">
               <a:rPr lang="en-GB" smtClean="0"/>
-              <a:t>13/02/2017</a:t>
+              <a:t>14/02/2017</a:t>
             </a:fld>
             <a:endParaRPr lang="en-GB"/>
           </a:p>
@@ -1836,7 +1836,7 @@
           <a:p>
             <a:fld id="{B87DEC26-9C8D-4E28-8922-A42F0CC7A2F8}" type="datetimeFigureOut">
               <a:rPr lang="en-GB" smtClean="0"/>
-              <a:t>13/02/2017</a:t>
+              <a:t>14/02/2017</a:t>
             </a:fld>
             <a:endParaRPr lang="en-GB"/>
           </a:p>
@@ -2113,7 +2113,7 @@
           <a:p>
             <a:fld id="{B87DEC26-9C8D-4E28-8922-A42F0CC7A2F8}" type="datetimeFigureOut">
               <a:rPr lang="en-GB" smtClean="0"/>
-              <a:t>13/02/2017</a:t>
+              <a:t>14/02/2017</a:t>
             </a:fld>
             <a:endParaRPr lang="en-GB"/>
           </a:p>
@@ -2370,7 +2370,7 @@
           <a:p>
             <a:fld id="{B87DEC26-9C8D-4E28-8922-A42F0CC7A2F8}" type="datetimeFigureOut">
               <a:rPr lang="en-GB" smtClean="0"/>
-              <a:t>13/02/2017</a:t>
+              <a:t>14/02/2017</a:t>
             </a:fld>
             <a:endParaRPr lang="en-GB"/>
           </a:p>
@@ -2583,7 +2583,7 @@
           <a:p>
             <a:fld id="{B87DEC26-9C8D-4E28-8922-A42F0CC7A2F8}" type="datetimeFigureOut">
               <a:rPr lang="en-GB" smtClean="0"/>
-              <a:t>13/02/2017</a:t>
+              <a:t>14/02/2017</a:t>
             </a:fld>
             <a:endParaRPr lang="en-GB"/>
           </a:p>
@@ -3009,8 +3009,8 @@
         </p:blipFill>
         <p:spPr>
           <a:xfrm>
-            <a:off x="3355363" y="115483"/>
-            <a:ext cx="6375491" cy="6039165"/>
+            <a:off x="3320245" y="123172"/>
+            <a:ext cx="6465541" cy="6031476"/>
           </a:xfrm>
           <a:prstGeom prst="rect">
             <a:avLst/>
@@ -3101,7 +3101,7 @@
         </p:nvSpPr>
         <p:spPr>
           <a:xfrm>
-            <a:off x="6586381" y="1166060"/>
+            <a:off x="6674063" y="1103430"/>
             <a:ext cx="2745535" cy="1015663"/>
           </a:xfrm>
           <a:prstGeom prst="rect">
@@ -3155,23 +3155,7 @@
           <a:p>
             <a:r>
               <a:rPr lang="en-GB" i="1" dirty="0" smtClean="0"/>
-              <a:t>Build </a:t>
-            </a:r>
-            <a:r>
-              <a:rPr lang="en-GB" i="1" dirty="0" smtClean="0"/>
-              <a:t>amazing </a:t>
-            </a:r>
-            <a:r>
-              <a:rPr lang="en-GB" i="1" dirty="0" smtClean="0"/>
-              <a:t>things, turn blocks into </a:t>
-            </a:r>
-            <a:r>
-              <a:rPr lang="en-GB" i="1" dirty="0" smtClean="0"/>
-              <a:t>bombs, </a:t>
-            </a:r>
-            <a:r>
-              <a:rPr lang="en-GB" i="1" dirty="0" smtClean="0"/>
-              <a:t>or create interactive games, just with one click! </a:t>
+              <a:t>Build amazing things, turn blocks into bombs, or create interactive games, just with one click! </a:t>
             </a:r>
             <a:endParaRPr lang="en-GB" i="1" dirty="0"/>
           </a:p>
@@ -3185,8 +3169,8 @@
         </p:nvSpPr>
         <p:spPr>
           <a:xfrm>
-            <a:off x="157381" y="6154648"/>
-            <a:ext cx="9591743" cy="594676"/>
+            <a:off x="137787" y="6154648"/>
+            <a:ext cx="9648000" cy="594676"/>
           </a:xfrm>
           <a:prstGeom prst="rect">
             <a:avLst/>
@@ -3231,7 +3215,7 @@
           </p:cNvPicPr>
           <p:nvPr/>
         </p:nvPicPr>
-        <p:blipFill>
+        <p:blipFill rotWithShape="1">
           <a:blip r:embed="rId3" cstate="print">
             <a:extLst>
               <a:ext uri="{28A0092B-C50C-407E-A947-70E740481C1C}">
@@ -3239,15 +3223,13 @@
               </a:ext>
             </a:extLst>
           </a:blip>
-          <a:srcRect/>
-          <a:stretch>
-            <a:fillRect/>
-          </a:stretch>
+          <a:srcRect l="6435" r="6616"/>
+          <a:stretch/>
         </p:blipFill>
         <p:spPr bwMode="auto">
           <a:xfrm>
-            <a:off x="8055090" y="6174713"/>
-            <a:ext cx="1675764" cy="580930"/>
+            <a:off x="8313234" y="6163561"/>
+            <a:ext cx="1457067" cy="580930"/>
           </a:xfrm>
           <a:prstGeom prst="rect">
             <a:avLst/>
@@ -3285,7 +3267,7 @@
         </p:blipFill>
         <p:spPr bwMode="auto">
           <a:xfrm>
-            <a:off x="6626026" y="6198765"/>
+            <a:off x="6676130" y="6198765"/>
             <a:ext cx="502113" cy="506440"/>
           </a:xfrm>
           <a:prstGeom prst="rect">
@@ -3396,15 +3378,7 @@
             </a:r>
             <a:r>
               <a:rPr lang="en-GB" dirty="0" smtClean="0"/>
-              <a:t> Mod provides an interactive way to get started with Python programming inside your </a:t>
-            </a:r>
-            <a:r>
-              <a:rPr lang="en-GB" dirty="0" smtClean="0"/>
-              <a:t>own Minecraft </a:t>
-            </a:r>
-            <a:r>
-              <a:rPr lang="en-GB" dirty="0" smtClean="0"/>
-              <a:t>adventures.</a:t>
+              <a:t> Mod provides an interactive way to get started with Python programming inside your own Minecraft adventures.</a:t>
             </a:r>
           </a:p>
         </p:txBody>
@@ -3495,7 +3469,7 @@
         </p:nvSpPr>
         <p:spPr>
           <a:xfrm>
-            <a:off x="6600858" y="687579"/>
+            <a:off x="6688540" y="624949"/>
             <a:ext cx="2675998" cy="523220"/>
           </a:xfrm>
           <a:prstGeom prst="rect">
@@ -3523,15 +3497,7 @@
                   <a:srgbClr val="002060"/>
                 </a:solidFill>
               </a:rPr>
-              <a:t> </a:t>
-            </a:r>
-            <a:r>
-              <a:rPr lang="en-GB" sz="2800" dirty="0" smtClean="0">
-                <a:solidFill>
-                  <a:srgbClr val="002060"/>
-                </a:solidFill>
-              </a:rPr>
-              <a:t>Mod</a:t>
+              <a:t> Mod</a:t>
             </a:r>
             <a:endParaRPr lang="en-GB" sz="2800" dirty="0">
               <a:solidFill>
@@ -3541,6 +3507,52 @@
           </a:p>
         </p:txBody>
       </p:sp>
+      <p:pic>
+        <p:nvPicPr>
+          <p:cNvPr id="9" name="Picture 8"/>
+          <p:cNvPicPr>
+            <a:picLocks noChangeAspect="1"/>
+          </p:cNvPicPr>
+          <p:nvPr/>
+        </p:nvPicPr>
+        <p:blipFill>
+          <a:blip r:embed="rId6">
+            <a:extLst>
+              <a:ext uri="{BEBA8EAE-BF5A-486C-A8C5-ECC9F3942E4B}">
+                <a14:imgProps xmlns:a14="http://schemas.microsoft.com/office/drawing/2010/main">
+                  <a14:imgLayer r:embed="rId7">
+                    <a14:imgEffect>
+                      <a14:backgroundRemoval t="2778" b="96627" l="1699" r="97948">
+                        <a14:foregroundMark x1="50602" y1="90873" x2="50602" y2="90873"/>
+                        <a14:foregroundMark x1="53503" y1="58532" x2="53503" y2="58532"/>
+                        <a14:foregroundMark x1="82166" y1="50794" x2="82166" y2="50794"/>
+                        <a14:foregroundMark x1="36660" y1="41270" x2="36660" y2="41270"/>
+                        <a14:foregroundMark x1="4317" y1="34524" x2="4317" y2="34524"/>
+                        <a14:foregroundMark x1="16844" y1="6151" x2="16844" y2="6151"/>
+                      </a14:backgroundRemoval>
+                    </a14:imgEffect>
+                  </a14:imgLayer>
+                </a14:imgProps>
+              </a:ext>
+            </a:extLst>
+          </a:blip>
+          <a:stretch>
+            <a:fillRect/>
+          </a:stretch>
+        </p:blipFill>
+        <p:spPr>
+          <a:xfrm>
+            <a:off x="7211699" y="6255219"/>
+            <a:ext cx="1080643" cy="385452"/>
+          </a:xfrm>
+          <a:prstGeom prst="rect">
+            <a:avLst/>
+          </a:prstGeom>
+          <a:ln>
+            <a:noFill/>
+          </a:ln>
+        </p:spPr>
+      </p:pic>
     </p:spTree>
     <p:extLst>
       <p:ext uri="{BB962C8B-B14F-4D97-AF65-F5344CB8AC3E}">
@@ -3560,7 +3572,7 @@
     <p:bg>
       <p:bgPr>
         <a:solidFill>
-          <a:srgbClr val="005C84"/>
+          <a:schemeClr val="bg1"/>
         </a:solidFill>
         <a:effectLst/>
       </p:bgPr>
@@ -3581,14 +3593,57 @@
       </p:grpSpPr>
       <p:sp>
         <p:nvSpPr>
+          <p:cNvPr id="9" name="Rectangle 8"/>
+          <p:cNvSpPr/>
+          <p:nvPr/>
+        </p:nvSpPr>
+        <p:spPr>
+          <a:xfrm>
+            <a:off x="137786" y="125260"/>
+            <a:ext cx="9648000" cy="6624000"/>
+          </a:xfrm>
+          <a:prstGeom prst="rect">
+            <a:avLst/>
+          </a:prstGeom>
+          <a:solidFill>
+            <a:srgbClr val="005C84"/>
+          </a:solidFill>
+        </p:spPr>
+        <p:style>
+          <a:lnRef idx="2">
+            <a:schemeClr val="accent1">
+              <a:shade val="50000"/>
+            </a:schemeClr>
+          </a:lnRef>
+          <a:fillRef idx="1">
+            <a:schemeClr val="accent1"/>
+          </a:fillRef>
+          <a:effectRef idx="0">
+            <a:schemeClr val="accent1"/>
+          </a:effectRef>
+          <a:fontRef idx="minor">
+            <a:schemeClr val="lt1"/>
+          </a:fontRef>
+        </p:style>
+        <p:txBody>
+          <a:bodyPr rtlCol="0" anchor="ctr"/>
+          <a:lstStyle/>
+          <a:p>
+            <a:pPr algn="ctr"/>
+            <a:endParaRPr lang="en-US"/>
+          </a:p>
+        </p:txBody>
+      </p:sp>
+      <p:sp>
+        <p:nvSpPr>
           <p:cNvPr id="4" name="Rounded Rectangle 3"/>
           <p:cNvSpPr/>
           <p:nvPr/>
         </p:nvSpPr>
         <p:spPr>
           <a:xfrm>
-            <a:off x="6614482" y="140836"/>
-            <a:ext cx="3022986" cy="1633421"/>
+            <a:off x="6802372" y="215992"/>
+            <a:ext cx="2807960" cy="1633421"/>
           </a:xfrm>
           <a:prstGeom prst="roundRect">
             <a:avLst/>
@@ -3662,8 +3717,8 @@
         </p:nvSpPr>
         <p:spPr>
           <a:xfrm>
-            <a:off x="6736283" y="143041"/>
-            <a:ext cx="2806228" cy="1631216"/>
+            <a:off x="6924173" y="218197"/>
+            <a:ext cx="2697912" cy="1631216"/>
           </a:xfrm>
           <a:prstGeom prst="rect">
             <a:avLst/>
@@ -3718,16 +3773,7 @@
                 </a:solidFill>
                 <a:effectLst/>
               </a:rPr>
-              <a:t> interactively alters your Minecraft world in real time, using </a:t>
-            </a:r>
-            <a:r>
-              <a:rPr lang="en-GB" sz="2000" b="0" dirty="0" smtClean="0">
-                <a:solidFill>
-                  <a:srgbClr val="002060"/>
-                </a:solidFill>
-                <a:effectLst/>
-              </a:rPr>
-              <a:t>Python!</a:t>
+              <a:t> interactively alters your Minecraft world in real time, using Python!</a:t>
             </a:r>
             <a:endParaRPr lang="en-GB" sz="2000" dirty="0">
               <a:solidFill>
@@ -3745,8 +3791,8 @@
         </p:nvSpPr>
         <p:spPr>
           <a:xfrm>
-            <a:off x="6732867" y="2819860"/>
-            <a:ext cx="2877465" cy="1569660"/>
+            <a:off x="6920758" y="2844912"/>
+            <a:ext cx="2766400" cy="1569660"/>
           </a:xfrm>
           <a:prstGeom prst="rect">
             <a:avLst/>
@@ -3784,8 +3830,10 @@
                 <a:ea typeface="Helvetica" charset="0"/>
                 <a:cs typeface="Helvetica" charset="0"/>
               </a:rPr>
-              <a:t>Copyright (c) </a:t>
-            </a:r>
+              <a:t>Copyright (c) 2016,</a:t>
+            </a:r>
+          </a:p>
+          <a:p>
             <a:r>
               <a:rPr lang="en-GB" sz="1600" b="1" dirty="0" smtClean="0">
                 <a:solidFill>
@@ -3797,61 +3845,7 @@
                 <a:ea typeface="Helvetica" charset="0"/>
                 <a:cs typeface="Helvetica" charset="0"/>
               </a:rPr>
-              <a:t>2016,</a:t>
-            </a:r>
-          </a:p>
-          <a:p>
-            <a:r>
-              <a:rPr lang="en-GB" sz="1600" b="1" dirty="0" smtClean="0">
-                <a:solidFill>
-                  <a:schemeClr val="accent1">
-                    <a:lumMod val="40000"/>
-                    <a:lumOff val="60000"/>
-                  </a:schemeClr>
-                </a:solidFill>
-                <a:ea typeface="Helvetica" charset="0"/>
-                <a:cs typeface="Helvetica" charset="0"/>
-              </a:rPr>
-              <a:t>Alvaro </a:t>
-            </a:r>
-            <a:r>
-              <a:rPr lang="en-GB" sz="1600" b="1" dirty="0" smtClean="0">
-                <a:solidFill>
-                  <a:schemeClr val="accent1">
-                    <a:lumMod val="40000"/>
-                    <a:lumOff val="60000"/>
-                  </a:schemeClr>
-                </a:solidFill>
-                <a:ea typeface="Helvetica" charset="0"/>
-                <a:cs typeface="Helvetica" charset="0"/>
-              </a:rPr>
-              <a:t>Perez-Diaz </a:t>
-            </a:r>
-            <a:r>
-              <a:rPr lang="en-GB" sz="1600" b="1" dirty="0" smtClean="0">
-                <a:solidFill>
-                  <a:schemeClr val="accent1">
-                    <a:lumMod val="40000"/>
-                    <a:lumOff val="60000"/>
-                  </a:schemeClr>
-                </a:solidFill>
-                <a:ea typeface="Helvetica" charset="0"/>
-                <a:cs typeface="Helvetica" charset="0"/>
-              </a:rPr>
-              <a:t>&amp; </a:t>
-            </a:r>
-            <a:r>
-              <a:rPr lang="en-GB" sz="1600" b="1" dirty="0" smtClean="0">
-                <a:solidFill>
-                  <a:schemeClr val="accent1">
-                    <a:lumMod val="40000"/>
-                    <a:lumOff val="60000"/>
-                  </a:schemeClr>
-                </a:solidFill>
-                <a:ea typeface="Helvetica" charset="0"/>
-                <a:cs typeface="Helvetica" charset="0"/>
-              </a:rPr>
-              <a:t>Hans </a:t>
+              <a:t>Alvaro Perez-Diaz &amp; Hans </a:t>
             </a:r>
             <a:r>
               <a:rPr lang="en-GB" sz="1600" b="1" dirty="0" err="1" smtClean="0">
@@ -3915,8 +3909,8 @@
         </p:nvSpPr>
         <p:spPr>
           <a:xfrm>
-            <a:off x="6732867" y="1901064"/>
-            <a:ext cx="2675532" cy="861774"/>
+            <a:off x="6920757" y="1926116"/>
+            <a:ext cx="2572261" cy="861774"/>
           </a:xfrm>
           <a:prstGeom prst="rect">
             <a:avLst/>
@@ -3960,12 +3954,12 @@
           </a:p>
           <a:p>
             <a:r>
-              <a:rPr lang="en-GB" sz="1600" dirty="0" smtClean="0">
+              <a:rPr lang="en-GB" sz="1600" dirty="0" err="1" smtClean="0">
                 <a:solidFill>
                   <a:schemeClr val="bg1"/>
                 </a:solidFill>
               </a:rPr>
-              <a:t>a.perez-diaz@soton.ac.uk</a:t>
+              <a:t>ngcm@soton.ac.uk</a:t>
             </a:r>
             <a:endParaRPr lang="en-GB" sz="1600" dirty="0">
               <a:solidFill>
@@ -3983,8 +3977,8 @@
         </p:nvSpPr>
         <p:spPr>
           <a:xfrm>
-            <a:off x="286134" y="140836"/>
-            <a:ext cx="4816446" cy="4339650"/>
+            <a:off x="286133" y="140836"/>
+            <a:ext cx="5751411" cy="3970318"/>
           </a:xfrm>
           <a:prstGeom prst="rect">
             <a:avLst/>
@@ -4023,13 +4017,6 @@
               </a:rPr>
               <a:t>Write your own scripts or get plenty of examples online, and use them inside the game with the mighty Computer Block and Python Script items. </a:t>
             </a:r>
-            <a:endParaRPr lang="en-GB" sz="2000" dirty="0">
-              <a:solidFill>
-                <a:schemeClr val="bg1"/>
-              </a:solidFill>
-            </a:endParaRPr>
-          </a:p>
-          <a:p>
             <a:endParaRPr lang="en-GB" sz="2000" dirty="0" smtClean="0">
               <a:solidFill>
                 <a:schemeClr val="bg1"/>
@@ -4037,13 +4024,78 @@
             </a:endParaRPr>
           </a:p>
           <a:p>
-            <a:endParaRPr lang="en-GB" sz="2000" dirty="0">
+            <a:endParaRPr lang="en-GB" sz="2000" dirty="0" smtClean="0">
               <a:solidFill>
                 <a:schemeClr val="bg1"/>
               </a:solidFill>
             </a:endParaRPr>
           </a:p>
           <a:p>
+            <a:r>
+              <a:rPr lang="en-GB" sz="2400" b="1" dirty="0" smtClean="0">
+                <a:solidFill>
+                  <a:schemeClr val="bg1"/>
+                </a:solidFill>
+              </a:rPr>
+              <a:t>Why should you use </a:t>
+            </a:r>
+            <a:r>
+              <a:rPr lang="en-GB" sz="2400" b="1" dirty="0" err="1" smtClean="0">
+                <a:solidFill>
+                  <a:schemeClr val="bg1"/>
+                </a:solidFill>
+              </a:rPr>
+              <a:t>PythonTool</a:t>
+            </a:r>
+            <a:r>
+              <a:rPr lang="en-GB" sz="2400" b="1" dirty="0" smtClean="0">
+                <a:solidFill>
+                  <a:schemeClr val="bg1"/>
+                </a:solidFill>
+              </a:rPr>
+              <a:t>?</a:t>
+            </a:r>
+            <a:endParaRPr lang="en-GB" sz="2400" dirty="0">
+              <a:solidFill>
+                <a:schemeClr val="bg1"/>
+              </a:solidFill>
+            </a:endParaRPr>
+          </a:p>
+          <a:p>
+            <a:r>
+              <a:rPr lang="en-GB" sz="2000" dirty="0" err="1" smtClean="0">
+                <a:solidFill>
+                  <a:schemeClr val="bg1"/>
+                </a:solidFill>
+              </a:rPr>
+              <a:t>PythonTool</a:t>
+            </a:r>
+            <a:r>
+              <a:rPr lang="en-GB" sz="2000" dirty="0" smtClean="0">
+                <a:solidFill>
+                  <a:schemeClr val="bg1"/>
+                </a:solidFill>
+              </a:rPr>
+              <a:t> is a fun way to start learning incredible</a:t>
+            </a:r>
+          </a:p>
+          <a:p>
+            <a:r>
+              <a:rPr lang="en-GB" sz="2000" dirty="0">
+                <a:solidFill>
+                  <a:schemeClr val="bg1"/>
+                </a:solidFill>
+              </a:rPr>
+              <a:t>p</a:t>
+            </a:r>
+            <a:r>
+              <a:rPr lang="en-GB" sz="2000" dirty="0" smtClean="0">
+                <a:solidFill>
+                  <a:schemeClr val="bg1"/>
+                </a:solidFill>
+              </a:rPr>
+              <a:t>rogramming skills that are highly sought after around the world!</a:t>
+            </a:r>
             <a:endParaRPr lang="en-GB" sz="2000" dirty="0">
               <a:solidFill>
                 <a:schemeClr val="bg1"/>
@@ -4129,8 +4181,8 @@
         </p:nvSpPr>
         <p:spPr>
           <a:xfrm>
-            <a:off x="6614482" y="1901064"/>
-            <a:ext cx="3022986" cy="2483921"/>
+            <a:off x="6802372" y="1926116"/>
+            <a:ext cx="2807960" cy="2483921"/>
           </a:xfrm>
           <a:prstGeom prst="roundRect">
             <a:avLst/>

</xml_diff>

<commit_message>
Changed leaflet design as per suggestion of the print centre Also added template files to git hub, changed background colour to be brighter, and changed EPSRC logo to white instead of grey
</commit_message>
<xml_diff>
--- a/leaflet/brochure_design2.pptx
+++ b/leaflet/brochure_design2.pptx
@@ -3004,13 +3004,13 @@
               </a:ext>
             </a:extLst>
           </a:blip>
-          <a:srcRect l="15675" r="30345" b="9055"/>
+          <a:srcRect l="15675" t="3522" r="29341" b="3345"/>
           <a:stretch/>
         </p:blipFill>
         <p:spPr>
           <a:xfrm>
-            <a:off x="3320245" y="123172"/>
-            <a:ext cx="6465541" cy="6031476"/>
+            <a:off x="3294911" y="-5134"/>
+            <a:ext cx="6611089" cy="6176685"/>
           </a:xfrm>
           <a:prstGeom prst="rect">
             <a:avLst/>
@@ -3118,14 +3118,14 @@
             <a:r>
               <a:rPr lang="en-GB" sz="2000" dirty="0" smtClean="0">
                 <a:solidFill>
-                  <a:srgbClr val="002060"/>
+                  <a:srgbClr val="008BC6"/>
                 </a:solidFill>
               </a:rPr>
               <a:t>Learning programming with Python and Minecraft</a:t>
             </a:r>
             <a:endParaRPr lang="en-GB" sz="2000" dirty="0">
               <a:solidFill>
-                <a:srgbClr val="002060"/>
+                <a:srgbClr val="008BC6"/>
               </a:solidFill>
             </a:endParaRPr>
           </a:p>
@@ -3169,14 +3169,14 @@
         </p:nvSpPr>
         <p:spPr>
           <a:xfrm>
-            <a:off x="137787" y="6154648"/>
-            <a:ext cx="9648000" cy="594676"/>
+            <a:off x="0" y="6154648"/>
+            <a:ext cx="9905999" cy="703352"/>
           </a:xfrm>
           <a:prstGeom prst="rect">
             <a:avLst/>
           </a:prstGeom>
           <a:solidFill>
-            <a:srgbClr val="005C84"/>
+            <a:srgbClr val="007DB2"/>
           </a:solidFill>
           <a:ln>
             <a:noFill/>
@@ -3209,7 +3209,7 @@
       </p:sp>
       <p:pic>
         <p:nvPicPr>
-          <p:cNvPr id="1026" name="Picture 2" descr="Image result for southampton university logo png"/>
+          <p:cNvPr id="1028" name="Picture 4" descr="Image result for ngcm southampton png"/>
           <p:cNvPicPr>
             <a:picLocks noChangeAspect="1" noChangeArrowheads="1"/>
           </p:cNvPicPr>
@@ -3223,51 +3223,12 @@
               </a:ext>
             </a:extLst>
           </a:blip>
-          <a:srcRect l="6435" r="6616"/>
-          <a:stretch/>
-        </p:blipFill>
-        <p:spPr bwMode="auto">
-          <a:xfrm>
-            <a:off x="8313234" y="6163561"/>
-            <a:ext cx="1457067" cy="580930"/>
-          </a:xfrm>
-          <a:prstGeom prst="rect">
-            <a:avLst/>
-          </a:prstGeom>
-          <a:noFill/>
-          <a:extLst>
-            <a:ext uri="{909E8E84-426E-40DD-AFC4-6F175D3DCCD1}">
-              <a14:hiddenFill xmlns:a14="http://schemas.microsoft.com/office/drawing/2010/main">
-                <a:solidFill>
-                  <a:srgbClr val="FFFFFF"/>
-                </a:solidFill>
-              </a14:hiddenFill>
-            </a:ext>
-          </a:extLst>
-        </p:spPr>
-      </p:pic>
-      <p:pic>
-        <p:nvPicPr>
-          <p:cNvPr id="1028" name="Picture 4" descr="Image result for ngcm southampton png"/>
-          <p:cNvPicPr>
-            <a:picLocks noChangeAspect="1" noChangeArrowheads="1"/>
-          </p:cNvPicPr>
-          <p:nvPr/>
-        </p:nvPicPr>
-        <p:blipFill rotWithShape="1">
-          <a:blip r:embed="rId4" cstate="print">
-            <a:extLst>
-              <a:ext uri="{28A0092B-C50C-407E-A947-70E740481C1C}">
-                <a14:useLocalDpi xmlns:a14="http://schemas.microsoft.com/office/drawing/2010/main" val="0"/>
-              </a:ext>
-            </a:extLst>
-          </a:blip>
           <a:srcRect b="4329"/>
           <a:stretch/>
         </p:blipFill>
         <p:spPr bwMode="auto">
           <a:xfrm>
-            <a:off x="6676130" y="6198765"/>
+            <a:off x="6641020" y="6194775"/>
             <a:ext cx="502113" cy="506440"/>
           </a:xfrm>
           <a:prstGeom prst="rect">
@@ -3440,7 +3401,7 @@
           <p:nvPr/>
         </p:nvPicPr>
         <p:blipFill>
-          <a:blip r:embed="rId5" cstate="print">
+          <a:blip r:embed="rId4" cstate="print">
             <a:extLst>
               <a:ext uri="{28A0092B-C50C-407E-A947-70E740481C1C}">
                 <a14:useLocalDpi xmlns:a14="http://schemas.microsoft.com/office/drawing/2010/main" val="0"/>
@@ -3486,7 +3447,7 @@
             <a:r>
               <a:rPr lang="en-GB" sz="2800" dirty="0" err="1" smtClean="0">
                 <a:solidFill>
-                  <a:srgbClr val="002060"/>
+                  <a:srgbClr val="008BC6"/>
                 </a:solidFill>
               </a:rPr>
               <a:t>PythonTool</a:t>
@@ -3494,14 +3455,14 @@
             <a:r>
               <a:rPr lang="en-GB" sz="2800" dirty="0" smtClean="0">
                 <a:solidFill>
-                  <a:srgbClr val="002060"/>
+                  <a:srgbClr val="008BC6"/>
                 </a:solidFill>
               </a:rPr>
               <a:t> Mod</a:t>
             </a:r>
             <a:endParaRPr lang="en-GB" sz="2800" dirty="0">
               <a:solidFill>
-                <a:srgbClr val="002060"/>
+                <a:srgbClr val="008BC6"/>
               </a:solidFill>
             </a:endParaRPr>
           </a:p>
@@ -3516,11 +3477,12 @@
           <p:nvPr/>
         </p:nvPicPr>
         <p:blipFill>
-          <a:blip r:embed="rId6">
+          <a:blip r:embed="rId5">
+            <a:biLevel thresh="25000"/>
             <a:extLst>
               <a:ext uri="{BEBA8EAE-BF5A-486C-A8C5-ECC9F3942E4B}">
                 <a14:imgProps xmlns:a14="http://schemas.microsoft.com/office/drawing/2010/main">
-                  <a14:imgLayer r:embed="rId7">
+                  <a14:imgLayer r:embed="rId6">
                     <a14:imgEffect>
                       <a14:backgroundRemoval t="2778" b="96627" l="1699" r="97948">
                         <a14:foregroundMark x1="50602" y1="90873" x2="50602" y2="90873"/>
@@ -3542,7 +3504,7 @@
         </p:blipFill>
         <p:spPr>
           <a:xfrm>
-            <a:off x="7211699" y="6255219"/>
+            <a:off x="8703220" y="6243507"/>
             <a:ext cx="1080643" cy="385452"/>
           </a:xfrm>
           <a:prstGeom prst="rect">
@@ -3551,6 +3513,77 @@
           <a:ln>
             <a:noFill/>
           </a:ln>
+        </p:spPr>
+      </p:pic>
+      <p:pic>
+        <p:nvPicPr>
+          <p:cNvPr id="3" name="Picture 2"/>
+          <p:cNvPicPr>
+            <a:picLocks noChangeAspect="1"/>
+          </p:cNvPicPr>
+          <p:nvPr/>
+        </p:nvPicPr>
+        <p:blipFill rotWithShape="1">
+          <a:blip r:embed="rId7">
+            <a:extLst>
+              <a:ext uri="{BEBA8EAE-BF5A-486C-A8C5-ECC9F3942E4B}">
+                <a14:imgProps xmlns:a14="http://schemas.microsoft.com/office/drawing/2010/main">
+                  <a14:imgLayer r:embed="rId8">
+                    <a14:imgEffect>
+                      <a14:backgroundRemoval t="9711" b="89669" l="5976" r="93377">
+                        <a14:foregroundMark x1="10223" y1="45455" x2="10223" y2="45455"/>
+                        <a14:foregroundMark x1="21958" y1="52066" x2="21958" y2="52066"/>
+                        <a14:foregroundMark x1="23974" y1="52066" x2="23974" y2="52066"/>
+                        <a14:foregroundMark x1="29086" y1="51860" x2="29086" y2="51860"/>
+                        <a14:foregroundMark x1="32325" y1="52479" x2="32325" y2="52479"/>
+                        <a14:foregroundMark x1="37437" y1="46901" x2="37437" y2="46901"/>
+                        <a14:foregroundMark x1="49964" y1="52686" x2="49964" y2="52686"/>
+                        <a14:foregroundMark x1="65731" y1="51240" x2="65731" y2="51240"/>
+                        <a14:foregroundMark x1="73866" y1="51033" x2="73866" y2="51033"/>
+                        <a14:foregroundMark x1="78762" y1="51240" x2="78762" y2="51240"/>
+                        <a14:foregroundMark x1="86465" y1="55579" x2="86465" y2="55579"/>
+                        <a14:foregroundMark x1="80634" y1="30165" x2="80634" y2="30165"/>
+                        <a14:foregroundMark x1="79626" y1="30372" x2="79626" y2="30372"/>
+                        <a14:foregroundMark x1="71922" y1="30785" x2="71922" y2="30785"/>
+                        <a14:foregroundMark x1="76026" y1="30165" x2="76026" y2="30165"/>
+                        <a14:foregroundMark x1="73002" y1="25000" x2="73002" y2="25000"/>
+                        <a14:foregroundMark x1="77682" y1="23554" x2="77682" y2="23554"/>
+                        <a14:foregroundMark x1="77898" y1="35744" x2="77898" y2="35744"/>
+                        <a14:foregroundMark x1="72498" y1="27686" x2="72498" y2="27686"/>
+                        <a14:foregroundMark x1="68035" y1="24174" x2="68035" y2="24174"/>
+                        <a14:foregroundMark x1="65371" y1="33678" x2="65371" y2="33678"/>
+                        <a14:foregroundMark x1="64363" y1="32851" x2="64363" y2="32851"/>
+                        <a14:foregroundMark x1="59827" y1="30785" x2="59827" y2="30785"/>
+                        <a14:foregroundMark x1="62131" y1="35124" x2="62131" y2="35124"/>
+                        <a14:foregroundMark x1="63859" y1="24380" x2="63859" y2="24380"/>
+                        <a14:foregroundMark x1="59323" y1="23967" x2="59323" y2="23967"/>
+                        <a14:foregroundMark x1="55436" y1="30579" x2="55436" y2="30579"/>
+                        <a14:foregroundMark x1="52700" y1="33058" x2="52700" y2="33058"/>
+                        <a14:foregroundMark x1="54356" y1="24380" x2="54356" y2="24380"/>
+                        <a14:foregroundMark x1="53852" y1="27479" x2="53852" y2="27479"/>
+                        <a14:foregroundMark x1="49748" y1="30785" x2="49748" y2="30785"/>
+                        <a14:foregroundMark x1="47444" y1="31198" x2="47444" y2="31198"/>
+                        <a14:foregroundMark x1="41109" y1="30579" x2="41109" y2="30579"/>
+                        <a14:foregroundMark x1="43988" y1="27893" x2="43988" y2="27893"/>
+                        <a14:backgroundMark x1="59467" y1="27273" x2="59467" y2="27273"/>
+                      </a14:backgroundRemoval>
+                    </a14:imgEffect>
+                  </a14:imgLayer>
+                </a14:imgProps>
+              </a:ext>
+            </a:extLst>
+          </a:blip>
+          <a:srcRect l="-1491" t="18375" r="7306" b="19570"/>
+          <a:stretch/>
+        </p:blipFill>
+        <p:spPr>
+          <a:xfrm>
+            <a:off x="7027438" y="6269475"/>
+            <a:ext cx="1642533" cy="377091"/>
+          </a:xfrm>
+          <a:prstGeom prst="rect">
+            <a:avLst/>
+          </a:prstGeom>
         </p:spPr>
       </p:pic>
     </p:spTree>
@@ -3599,14 +3632,14 @@
         </p:nvSpPr>
         <p:spPr>
           <a:xfrm>
-            <a:off x="137786" y="125260"/>
-            <a:ext cx="9648000" cy="6624000"/>
+            <a:off x="0" y="0"/>
+            <a:ext cx="9906000" cy="6858000"/>
           </a:xfrm>
           <a:prstGeom prst="rect">
             <a:avLst/>
           </a:prstGeom>
           <a:solidFill>
-            <a:srgbClr val="005C84"/>
+            <a:srgbClr val="008BC6"/>
           </a:solidFill>
         </p:spPr>
         <p:style>
@@ -3642,11 +3675,13 @@
         </p:nvSpPr>
         <p:spPr>
           <a:xfrm>
-            <a:off x="6802372" y="215992"/>
+            <a:off x="6802372" y="247387"/>
             <a:ext cx="2807960" cy="1633421"/>
           </a:xfrm>
           <a:prstGeom prst="roundRect">
-            <a:avLst/>
+            <a:avLst>
+              <a:gd name="adj" fmla="val 9147"/>
+            </a:avLst>
           </a:prstGeom>
           <a:solidFill>
             <a:schemeClr val="bg1"/>
@@ -3717,7 +3752,7 @@
         </p:nvSpPr>
         <p:spPr>
           <a:xfrm>
-            <a:off x="6924173" y="218197"/>
+            <a:off x="6924173" y="259141"/>
             <a:ext cx="2697912" cy="1631216"/>
           </a:xfrm>
           <a:prstGeom prst="rect">
@@ -3733,7 +3768,7 @@
             <a:r>
               <a:rPr lang="en-GB" sz="2000" b="1" dirty="0" err="1" smtClean="0">
                 <a:solidFill>
-                  <a:srgbClr val="002060"/>
+                  <a:srgbClr val="008BC6"/>
                 </a:solidFill>
                 <a:effectLst/>
               </a:rPr>
@@ -3742,7 +3777,7 @@
             <a:r>
               <a:rPr lang="en-GB" sz="2000" b="1" dirty="0" smtClean="0">
                 <a:solidFill>
-                  <a:srgbClr val="002060"/>
+                  <a:srgbClr val="008BC6"/>
                 </a:solidFill>
                 <a:effectLst/>
               </a:rPr>
@@ -3751,7 +3786,7 @@
             <a:r>
               <a:rPr lang="en-GB" sz="2000" b="0" dirty="0" smtClean="0">
                 <a:solidFill>
-                  <a:srgbClr val="002060"/>
+                  <a:srgbClr val="008BC6"/>
                 </a:solidFill>
                 <a:effectLst/>
               </a:rPr>
@@ -3760,7 +3795,7 @@
             <a:r>
               <a:rPr lang="en-GB" sz="2000" b="1" dirty="0" smtClean="0">
                 <a:solidFill>
-                  <a:srgbClr val="002060"/>
+                  <a:srgbClr val="008BC6"/>
                 </a:solidFill>
                 <a:effectLst/>
               </a:rPr>
@@ -3769,7 +3804,7 @@
             <a:r>
               <a:rPr lang="en-GB" sz="2000" b="0" dirty="0" smtClean="0">
                 <a:solidFill>
-                  <a:srgbClr val="002060"/>
+                  <a:srgbClr val="008BC6"/>
                 </a:solidFill>
                 <a:effectLst/>
               </a:rPr>
@@ -3777,7 +3812,7 @@
             </a:r>
             <a:endParaRPr lang="en-GB" sz="2000" dirty="0">
               <a:solidFill>
-                <a:srgbClr val="002060"/>
+                <a:srgbClr val="008BC6"/>
               </a:solidFill>
             </a:endParaRPr>
           </a:p>
@@ -3791,8 +3826,8 @@
         </p:nvSpPr>
         <p:spPr>
           <a:xfrm>
-            <a:off x="6920758" y="2844912"/>
-            <a:ext cx="2766400" cy="1569660"/>
+            <a:off x="6802372" y="2885856"/>
+            <a:ext cx="2884786" cy="1323439"/>
           </a:xfrm>
           <a:prstGeom prst="rect">
             <a:avLst/>
@@ -3807,53 +3842,51 @@
             <a:r>
               <a:rPr lang="en-GB" sz="1600" b="1" dirty="0" smtClean="0">
                 <a:solidFill>
-                  <a:schemeClr val="accent1">
-                    <a:lumMod val="40000"/>
-                    <a:lumOff val="60000"/>
-                  </a:schemeClr>
+                  <a:schemeClr val="bg1"/>
                 </a:solidFill>
                 <a:ea typeface="Helvetica" charset="0"/>
                 <a:cs typeface="Helvetica" charset="0"/>
               </a:rPr>
-              <a:t>MIT License </a:t>
+              <a:t>MIT License Copyright (c) 2016</a:t>
             </a:r>
           </a:p>
           <a:p>
             <a:r>
               <a:rPr lang="en-GB" sz="1600" b="1" dirty="0" smtClean="0">
                 <a:solidFill>
-                  <a:schemeClr val="accent1">
-                    <a:lumMod val="40000"/>
-                    <a:lumOff val="60000"/>
-                  </a:schemeClr>
+                  <a:schemeClr val="bg1"/>
                 </a:solidFill>
                 <a:ea typeface="Helvetica" charset="0"/>
                 <a:cs typeface="Helvetica" charset="0"/>
               </a:rPr>
-              <a:t>Copyright (c) 2016,</a:t>
-            </a:r>
-          </a:p>
-          <a:p>
-            <a:r>
-              <a:rPr lang="en-GB" sz="1600" b="1" dirty="0" smtClean="0">
-                <a:solidFill>
-                  <a:schemeClr val="accent1">
-                    <a:lumMod val="40000"/>
-                    <a:lumOff val="60000"/>
-                  </a:schemeClr>
+              <a:t>Alvaro Perez-Diaz &amp; </a:t>
+            </a:r>
+          </a:p>
+          <a:p>
+            <a:r>
+              <a:rPr lang="en-GB" sz="1600" b="1" dirty="0">
+                <a:solidFill>
+                  <a:schemeClr val="bg1"/>
                 </a:solidFill>
                 <a:ea typeface="Helvetica" charset="0"/>
                 <a:cs typeface="Helvetica" charset="0"/>
               </a:rPr>
-              <a:t>Alvaro Perez-Diaz &amp; Hans </a:t>
+              <a:t> </a:t>
+            </a:r>
+            <a:r>
+              <a:rPr lang="en-GB" sz="1600" b="1" dirty="0" smtClean="0">
+                <a:solidFill>
+                  <a:schemeClr val="bg1"/>
+                </a:solidFill>
+                <a:ea typeface="Helvetica" charset="0"/>
+                <a:cs typeface="Helvetica" charset="0"/>
+              </a:rPr>
+              <a:t>   Hans </a:t>
             </a:r>
             <a:r>
               <a:rPr lang="en-GB" sz="1600" b="1" dirty="0" err="1" smtClean="0">
                 <a:solidFill>
-                  <a:schemeClr val="accent1">
-                    <a:lumMod val="40000"/>
-                    <a:lumOff val="60000"/>
-                  </a:schemeClr>
+                  <a:schemeClr val="bg1"/>
                 </a:solidFill>
                 <a:ea typeface="Helvetica" charset="0"/>
                 <a:cs typeface="Helvetica" charset="0"/>
@@ -3863,25 +3896,19 @@
             <a:r>
               <a:rPr lang="en-GB" sz="1600" b="1" dirty="0" smtClean="0">
                 <a:solidFill>
-                  <a:schemeClr val="accent1">
-                    <a:lumMod val="40000"/>
-                    <a:lumOff val="60000"/>
-                  </a:schemeClr>
+                  <a:schemeClr val="bg1"/>
                 </a:solidFill>
                 <a:ea typeface="Helvetica" charset="0"/>
                 <a:cs typeface="Helvetica" charset="0"/>
               </a:rPr>
-              <a:t>.</a:t>
+              <a:t>,</a:t>
             </a:r>
           </a:p>
           <a:p>
             <a:r>
               <a:rPr lang="en-GB" sz="1600" b="1" dirty="0" smtClean="0">
                 <a:solidFill>
-                  <a:schemeClr val="accent1">
-                    <a:lumMod val="40000"/>
-                    <a:lumOff val="60000"/>
-                  </a:schemeClr>
+                  <a:schemeClr val="bg1"/>
                 </a:solidFill>
                 <a:ea typeface="Helvetica" charset="0"/>
                 <a:cs typeface="Helvetica" charset="0"/>
@@ -3890,10 +3917,7 @@
             </a:r>
             <a:endParaRPr lang="en-GB" sz="1600" b="1" dirty="0">
               <a:solidFill>
-                <a:schemeClr val="accent1">
-                  <a:lumMod val="40000"/>
-                  <a:lumOff val="60000"/>
-                </a:schemeClr>
+                <a:schemeClr val="bg1"/>
               </a:solidFill>
               <a:ea typeface="Helvetica" charset="0"/>
               <a:cs typeface="Helvetica" charset="0"/>
@@ -3909,7 +3933,7 @@
         </p:nvSpPr>
         <p:spPr>
           <a:xfrm>
-            <a:off x="6920757" y="1926116"/>
+            <a:off x="6920757" y="1967060"/>
             <a:ext cx="2572261" cy="861774"/>
           </a:xfrm>
           <a:prstGeom prst="rect">
@@ -3923,6 +3947,7 @@
           </a:bodyPr>
           <a:lstStyle/>
           <a:p>
+            <a:pPr algn="ctr"/>
             <a:r>
               <a:rPr lang="en-GB" b="1" dirty="0" smtClean="0">
                 <a:solidFill>
@@ -3935,6 +3960,7 @@
             </a:r>
           </a:p>
           <a:p>
+            <a:pPr algn="ctr"/>
             <a:r>
               <a:rPr lang="en-GB" sz="1600" i="1" dirty="0" err="1" smtClean="0">
                 <a:solidFill>
@@ -3953,6 +3979,7 @@
             </a:r>
           </a:p>
           <a:p>
+            <a:pPr algn="ctr"/>
             <a:r>
               <a:rPr lang="en-GB" sz="1600" dirty="0" err="1" smtClean="0">
                 <a:solidFill>
@@ -3977,7 +4004,7 @@
         </p:nvSpPr>
         <p:spPr>
           <a:xfrm>
-            <a:off x="286133" y="140836"/>
+            <a:off x="286133" y="209076"/>
             <a:ext cx="5751411" cy="3970318"/>
           </a:xfrm>
           <a:prstGeom prst="rect">
@@ -4017,11 +4044,6 @@
               </a:rPr>
               <a:t>Write your own scripts or get plenty of examples online, and use them inside the game with the mighty Computer Block and Python Script items. </a:t>
             </a:r>
-            <a:endParaRPr lang="en-GB" sz="2000" dirty="0" smtClean="0">
-              <a:solidFill>
-                <a:schemeClr val="bg1"/>
-              </a:solidFill>
-            </a:endParaRPr>
           </a:p>
           <a:p>
             <a:endParaRPr lang="en-GB" sz="2000" dirty="0" smtClean="0">
@@ -4181,19 +4203,18 @@
         </p:nvSpPr>
         <p:spPr>
           <a:xfrm>
-            <a:off x="6802372" y="1926116"/>
-            <a:ext cx="2807960" cy="2483921"/>
+            <a:off x="6802372" y="1967060"/>
+            <a:ext cx="2807960" cy="2242235"/>
           </a:xfrm>
           <a:prstGeom prst="roundRect">
-            <a:avLst/>
+            <a:avLst>
+              <a:gd name="adj" fmla="val 7358"/>
+            </a:avLst>
           </a:prstGeom>
           <a:noFill/>
           <a:ln w="41275">
             <a:solidFill>
-              <a:schemeClr val="accent1">
-                <a:lumMod val="40000"/>
-                <a:lumOff val="60000"/>
-              </a:schemeClr>
+              <a:schemeClr val="bg1"/>
             </a:solidFill>
           </a:ln>
         </p:spPr>
@@ -4218,7 +4239,11 @@
           <a:lstStyle/>
           <a:p>
             <a:pPr algn="ctr"/>
-            <a:endParaRPr lang="en-GB"/>
+            <a:endParaRPr lang="en-GB">
+              <a:solidFill>
+                <a:schemeClr val="bg1"/>
+              </a:solidFill>
+            </a:endParaRPr>
           </a:p>
         </p:txBody>
       </p:sp>

</xml_diff>

<commit_message>
Noticed slight white edge Extended images past A4 border in order to eliminate any possibility of this, should now not get any white edging where it's not wanted
</commit_message>
<xml_diff>
--- a/leaflet/brochure_design2.pptx
+++ b/leaflet/brochure_design2.pptx
@@ -3004,13 +3004,13 @@
               </a:ext>
             </a:extLst>
           </a:blip>
-          <a:srcRect l="15675" t="3522" r="29341" b="3345"/>
+          <a:srcRect l="15675" t="1812" r="28214" b="3345"/>
           <a:stretch/>
         </p:blipFill>
         <p:spPr>
           <a:xfrm>
-            <a:off x="3294911" y="-5134"/>
-            <a:ext cx="6611089" cy="6176685"/>
+            <a:off x="3294911" y="-118532"/>
+            <a:ext cx="6746556" cy="6290084"/>
           </a:xfrm>
           <a:prstGeom prst="rect">
             <a:avLst/>
@@ -3169,8 +3169,8 @@
         </p:nvSpPr>
         <p:spPr>
           <a:xfrm>
-            <a:off x="0" y="6154648"/>
-            <a:ext cx="9905999" cy="703352"/>
+            <a:off x="-118532" y="6154647"/>
+            <a:ext cx="10160000" cy="838819"/>
           </a:xfrm>
           <a:prstGeom prst="rect">
             <a:avLst/>
@@ -3632,8 +3632,8 @@
         </p:nvSpPr>
         <p:spPr>
           <a:xfrm>
-            <a:off x="0" y="0"/>
-            <a:ext cx="9906000" cy="6858000"/>
+            <a:off x="-135467" y="-118533"/>
+            <a:ext cx="10210800" cy="7112000"/>
           </a:xfrm>
           <a:prstGeom prst="rect">
             <a:avLst/>

</xml_diff>